<commit_message>
Add updated cheatsheet files
</commit_message>
<xml_diff>
--- a/vignettes/cheatsheet/quanteda-cheatsheet.pptx
+++ b/vignettes/cheatsheet/quanteda-cheatsheet.pptx
@@ -374,7 +374,7 @@
           <a:bodyPr/>
           <a:lstStyle/>
           <a:p>
-            <a:endParaRPr lang="en-US"/>
+            <a:endParaRPr lang="en-US" dirty="0"/>
           </a:p>
         </p:txBody>
       </p:sp>
@@ -2040,7 +2040,7 @@
         </p:nvSpPr>
         <p:spPr>
           <a:xfrm>
-            <a:off x="234138" y="1265212"/>
+            <a:off x="234138" y="1216444"/>
             <a:ext cx="3531950" cy="2724140"/>
           </a:xfrm>
           <a:prstGeom prst="rect">
@@ -2114,7 +2114,7 @@
         </p:nvSpPr>
         <p:spPr>
           <a:xfrm>
-            <a:off x="3928502" y="1261006"/>
+            <a:off x="3928502" y="1212238"/>
             <a:ext cx="2966163" cy="2724140"/>
           </a:xfrm>
           <a:prstGeom prst="rect">
@@ -2188,7 +2188,7 @@
         </p:nvSpPr>
         <p:spPr>
           <a:xfrm>
-            <a:off x="262622" y="4486087"/>
+            <a:off x="262622" y="4351975"/>
             <a:ext cx="6588000" cy="6233192"/>
           </a:xfrm>
           <a:prstGeom prst="rect">
@@ -2258,8 +2258,8 @@
         </p:nvSpPr>
         <p:spPr>
           <a:xfrm>
-            <a:off x="7137053" y="8539318"/>
-            <a:ext cx="6696000" cy="2179961"/>
+            <a:off x="7137053" y="8429591"/>
+            <a:ext cx="6696000" cy="2153497"/>
           </a:xfrm>
           <a:prstGeom prst="rect">
             <a:avLst/>
@@ -2328,7 +2328,7 @@
         </p:nvSpPr>
         <p:spPr>
           <a:xfrm>
-            <a:off x="262621" y="1760814"/>
+            <a:off x="262621" y="1712046"/>
             <a:ext cx="3503467" cy="2257028"/>
           </a:xfrm>
           <a:prstGeom prst="rect">
@@ -2546,7 +2546,23 @@
                 <a:ea typeface="Source Sans Pro" charset="0"/>
                 <a:cs typeface="Source Sans Pro" charset="0"/>
               </a:rPr>
-              <a:t>(</a:t>
+              <a:t>(un</a:t>
+            </a:r>
+            <a:r>
+              <a:rPr lang="en-US" sz="1400" dirty="0">
+                <a:latin typeface="Source Sans Pro" charset="0"/>
+                <a:ea typeface="Source Sans Pro" charset="0"/>
+                <a:cs typeface="Source Sans Pro" charset="0"/>
+              </a:rPr>
+              <a:t>-</a:t>
+            </a:r>
+            <a:r>
+              <a:rPr lang="en-US" sz="1400" smtClean="0">
+                <a:latin typeface="Source Sans Pro" charset="0"/>
+                <a:ea typeface="Source Sans Pro" charset="0"/>
+                <a:cs typeface="Source Sans Pro" charset="0"/>
+              </a:rPr>
+              <a:t>)supervised </a:t>
             </a:r>
             <a:r>
               <a:rPr lang="en-US" sz="1400" dirty="0" smtClean="0">
@@ -2554,37 +2570,8 @@
                 <a:ea typeface="Source Sans Pro" charset="0"/>
                 <a:cs typeface="Source Sans Pro" charset="0"/>
               </a:rPr>
-              <a:t>un</a:t>
-            </a:r>
-            <a:r>
-              <a:rPr lang="en-US" sz="1400" dirty="0">
-                <a:latin typeface="Source Sans Pro" charset="0"/>
-                <a:ea typeface="Source Sans Pro" charset="0"/>
-                <a:cs typeface="Source Sans Pro" charset="0"/>
-              </a:rPr>
-              <a:t>-</a:t>
-            </a:r>
-            <a:r>
-              <a:rPr lang="en-US" sz="1400" smtClean="0">
-                <a:latin typeface="Source Sans Pro" charset="0"/>
-                <a:ea typeface="Source Sans Pro" charset="0"/>
-                <a:cs typeface="Source Sans Pro" charset="0"/>
-              </a:rPr>
-              <a:t>)supervised </a:t>
-            </a:r>
-            <a:r>
-              <a:rPr lang="en-US" sz="1400" dirty="0" smtClean="0">
-                <a:latin typeface="Source Sans Pro" charset="0"/>
-                <a:ea typeface="Source Sans Pro" charset="0"/>
-                <a:cs typeface="Source Sans Pro" charset="0"/>
-              </a:rPr>
               <a:t>models</a:t>
             </a:r>
-            <a:endParaRPr lang="en-US" sz="1400" dirty="0" smtClean="0">
-              <a:latin typeface="Source Sans Pro" charset="0"/>
-              <a:ea typeface="Source Sans Pro" charset="0"/>
-              <a:cs typeface="Source Sans Pro" charset="0"/>
-            </a:endParaRPr>
           </a:p>
           <a:p>
             <a:pPr marL="171450" indent="-171450" algn="l">
@@ -2784,7 +2771,7 @@
         </p:nvSpPr>
         <p:spPr>
           <a:xfrm>
-            <a:off x="3625144" y="202897"/>
+            <a:off x="3625144" y="154129"/>
             <a:ext cx="3511910" cy="536848"/>
           </a:xfrm>
           <a:prstGeom prst="rect">
@@ -2825,7 +2812,7 @@
         </p:nvSpPr>
         <p:spPr>
           <a:xfrm>
-            <a:off x="234138" y="1101330"/>
+            <a:off x="234138" y="1052562"/>
             <a:ext cx="3531950" cy="465035"/>
           </a:xfrm>
           <a:prstGeom prst="roundRect">
@@ -2887,7 +2874,7 @@
         </p:nvSpPr>
         <p:spPr>
           <a:xfrm>
-            <a:off x="520861" y="4872791"/>
+            <a:off x="520861" y="4738679"/>
             <a:ext cx="6216624" cy="5796459"/>
           </a:xfrm>
           <a:prstGeom prst="rect">
@@ -4072,7 +4059,7 @@
         </p:nvSpPr>
         <p:spPr>
           <a:xfrm>
-            <a:off x="223865" y="4183800"/>
+            <a:off x="223865" y="4049688"/>
             <a:ext cx="6670800" cy="486431"/>
           </a:xfrm>
           <a:prstGeom prst="roundRect">
@@ -4181,7 +4168,7 @@
         </p:blipFill>
         <p:spPr>
           <a:xfrm>
-            <a:off x="244866" y="48928"/>
+            <a:off x="244866" y="160"/>
             <a:ext cx="3268239" cy="936000"/>
           </a:xfrm>
           <a:prstGeom prst="rect">
@@ -4197,7 +4184,7 @@
         </p:nvSpPr>
         <p:spPr>
           <a:xfrm>
-            <a:off x="7340628" y="690950"/>
+            <a:off x="7352820" y="581222"/>
             <a:ext cx="6645071" cy="7617470"/>
           </a:xfrm>
           <a:prstGeom prst="rect">
@@ -5676,7 +5663,7 @@
         </p:nvSpPr>
         <p:spPr>
           <a:xfrm>
-            <a:off x="4023836" y="1746744"/>
+            <a:off x="4023836" y="1697976"/>
             <a:ext cx="3053316" cy="2154436"/>
           </a:xfrm>
           <a:prstGeom prst="rect">
@@ -5861,7 +5848,7 @@
         </p:nvSpPr>
         <p:spPr>
           <a:xfrm>
-            <a:off x="3928502" y="1101330"/>
+            <a:off x="3928502" y="1052562"/>
             <a:ext cx="2966164" cy="460830"/>
           </a:xfrm>
           <a:prstGeom prst="roundRect">
@@ -5920,7 +5907,7 @@
         </p:nvSpPr>
         <p:spPr>
           <a:xfrm>
-            <a:off x="7099944" y="8278555"/>
+            <a:off x="7099944" y="8168827"/>
             <a:ext cx="6771600" cy="478998"/>
           </a:xfrm>
           <a:prstGeom prst="roundRect">
@@ -5979,7 +5966,7 @@
         </p:nvSpPr>
         <p:spPr>
           <a:xfrm>
-            <a:off x="10555295" y="10059755"/>
+            <a:off x="10555295" y="9950027"/>
             <a:ext cx="3000271" cy="200055"/>
           </a:xfrm>
           <a:prstGeom prst="rect">
@@ -6017,8 +6004,8 @@
         </p:nvSpPr>
         <p:spPr>
           <a:xfrm>
-            <a:off x="7137053" y="202897"/>
-            <a:ext cx="6696000" cy="7997801"/>
+            <a:off x="7149245" y="141938"/>
+            <a:ext cx="6696000" cy="7930698"/>
           </a:xfrm>
           <a:prstGeom prst="rect">
             <a:avLst/>
@@ -6087,7 +6074,7 @@
         </p:nvSpPr>
         <p:spPr>
           <a:xfrm>
-            <a:off x="7098027" y="103149"/>
+            <a:off x="7110219" y="42189"/>
             <a:ext cx="6771600" cy="491636"/>
           </a:xfrm>
           <a:prstGeom prst="roundRect">
@@ -6206,7 +6193,7 @@
         </p:nvSpPr>
         <p:spPr>
           <a:xfrm>
-            <a:off x="7340628" y="8754553"/>
+            <a:off x="7340628" y="8632633"/>
             <a:ext cx="5565144" cy="1926168"/>
           </a:xfrm>
           <a:prstGeom prst="rect">
@@ -6653,6 +6640,72 @@
               <a:ea typeface="Source Sans Pro" charset="0"/>
               <a:cs typeface="Source Sans Pro" charset="0"/>
             </a:endParaRPr>
+          </a:p>
+        </p:txBody>
+      </p:sp>
+      <p:sp>
+        <p:nvSpPr>
+          <p:cNvPr id="3" name="Rectangle 2"/>
+          <p:cNvSpPr/>
+          <p:nvPr/>
+        </p:nvSpPr>
+        <p:spPr>
+          <a:xfrm>
+            <a:off x="88151" y="10583088"/>
+            <a:ext cx="3340068" cy="272382"/>
+          </a:xfrm>
+          <a:prstGeom prst="rect">
+            <a:avLst/>
+          </a:prstGeom>
+        </p:spPr>
+        <p:txBody>
+          <a:bodyPr wrap="square">
+            <a:spAutoFit/>
+          </a:bodyPr>
+          <a:lstStyle/>
+          <a:p>
+            <a:pPr lvl="0" algn="r">
+              <a:lnSpc>
+                <a:spcPct val="90000"/>
+              </a:lnSpc>
+              <a:defRPr sz="1800"/>
+            </a:pPr>
+            <a:r>
+              <a:rPr lang="en-US" sz="1300" i="1" dirty="0">
+                <a:solidFill>
+                  <a:srgbClr val="000000"/>
+                </a:solidFill>
+                <a:latin typeface="Source Sans Pro" charset="0"/>
+                <a:ea typeface="Source Sans Pro" charset="0"/>
+                <a:cs typeface="Source Sans Pro" charset="0"/>
+                <a:sym typeface="Source Sans Pro Light"/>
+              </a:rPr>
+              <a:t>https://</a:t>
+            </a:r>
+            <a:r>
+              <a:rPr lang="en-US" sz="1300" i="1" dirty="0" err="1">
+                <a:solidFill>
+                  <a:srgbClr val="000000"/>
+                </a:solidFill>
+                <a:latin typeface="Source Sans Pro" charset="0"/>
+                <a:ea typeface="Source Sans Pro" charset="0"/>
+                <a:cs typeface="Source Sans Pro" charset="0"/>
+                <a:sym typeface="Source Sans Pro Light"/>
+              </a:rPr>
+              <a:t>creativecommons.org</a:t>
+            </a:r>
+            <a:r>
+              <a:rPr lang="en-US" sz="1300" i="1" dirty="0">
+                <a:solidFill>
+                  <a:srgbClr val="000000"/>
+                </a:solidFill>
+                <a:latin typeface="Source Sans Pro" charset="0"/>
+                <a:ea typeface="Source Sans Pro" charset="0"/>
+                <a:cs typeface="Source Sans Pro" charset="0"/>
+                <a:sym typeface="Source Sans Pro Light"/>
+              </a:rPr>
+              <a:t>/licenses/by/4.0/</a:t>
+            </a:r>
           </a:p>
         </p:txBody>
       </p:sp>
@@ -10047,7 +10100,7 @@
               <a:t>http://</a:t>
             </a:r>
             <a:r>
-              <a:rPr lang="en-US" sz="1400" i="1" err="1" smtClean="0">
+              <a:rPr lang="en-US" sz="1400" i="1" dirty="0" err="1" smtClean="0">
                 <a:solidFill>
                   <a:srgbClr val="006AC7"/>
                 </a:solidFill>
@@ -10059,7 +10112,7 @@
               <a:t>quanteda.io</a:t>
             </a:r>
             <a:r>
-              <a:rPr lang="en-US" sz="1400" i="1" smtClean="0">
+              <a:rPr lang="en-US" sz="1400" i="1" dirty="0" smtClean="0">
                 <a:solidFill>
                   <a:srgbClr val="006AC7"/>
                 </a:solidFill>
@@ -10071,7 +10124,7 @@
               <a:t>  </a:t>
             </a:r>
             <a:r>
-              <a:rPr lang="en-US" sz="1400" smtClean="0">
+              <a:rPr lang="en-US" sz="1400" dirty="0" smtClean="0">
                 <a:latin typeface="Source Sans Pro" charset="0"/>
                 <a:ea typeface="Source Sans Pro" charset="0"/>
                 <a:cs typeface="Source Sans Pro" charset="0"/>

</xml_diff>